<commit_message>
Update images and Proposal
</commit_message>
<xml_diff>
--- a/Proposal/Proposal.pptx
+++ b/Proposal/Proposal.pptx
@@ -120,6 +120,11 @@
       </a:defRPr>
     </a:lvl9pPr>
   </p:defaultTextStyle>
+  <p:extLst>
+    <p:ext uri="{EFAFB233-063F-42B5-8137-9DF3F51BA10A}">
+      <p15:sldGuideLst xmlns:p15="http://schemas.microsoft.com/office/powerpoint/2012/main"/>
+    </p:ext>
+  </p:extLst>
 </p:presentation>
 </file>
 
@@ -270,7 +275,7 @@
           <a:p>
             <a:fld id="{0B8780CC-EDEE-45A9-9439-C8B75D5F0949}" type="datetimeFigureOut">
               <a:rPr lang="en-US" smtClean="0"/>
-              <a:t>10/11/2023</a:t>
+              <a:t>11/7/2023</a:t>
             </a:fld>
             <a:endParaRPr lang="en-US"/>
           </a:p>
@@ -468,7 +473,7 @@
           <a:p>
             <a:fld id="{0B8780CC-EDEE-45A9-9439-C8B75D5F0949}" type="datetimeFigureOut">
               <a:rPr lang="en-US" smtClean="0"/>
-              <a:t>10/11/2023</a:t>
+              <a:t>11/7/2023</a:t>
             </a:fld>
             <a:endParaRPr lang="en-US"/>
           </a:p>
@@ -676,7 +681,7 @@
           <a:p>
             <a:fld id="{0B8780CC-EDEE-45A9-9439-C8B75D5F0949}" type="datetimeFigureOut">
               <a:rPr lang="en-US" smtClean="0"/>
-              <a:t>10/11/2023</a:t>
+              <a:t>11/7/2023</a:t>
             </a:fld>
             <a:endParaRPr lang="en-US"/>
           </a:p>
@@ -912,7 +917,7 @@
           <a:p>
             <a:fld id="{0B8780CC-EDEE-45A9-9439-C8B75D5F0949}" type="datetimeFigureOut">
               <a:rPr lang="en-US" smtClean="0"/>
-              <a:t>10/11/2023</a:t>
+              <a:t>11/7/2023</a:t>
             </a:fld>
             <a:endParaRPr lang="en-US"/>
           </a:p>
@@ -1187,7 +1192,7 @@
           <a:p>
             <a:fld id="{0B8780CC-EDEE-45A9-9439-C8B75D5F0949}" type="datetimeFigureOut">
               <a:rPr lang="en-US" smtClean="0"/>
-              <a:t>10/11/2023</a:t>
+              <a:t>11/7/2023</a:t>
             </a:fld>
             <a:endParaRPr lang="en-US"/>
           </a:p>
@@ -1452,7 +1457,7 @@
           <a:p>
             <a:fld id="{0B8780CC-EDEE-45A9-9439-C8B75D5F0949}" type="datetimeFigureOut">
               <a:rPr lang="en-US" smtClean="0"/>
-              <a:t>10/11/2023</a:t>
+              <a:t>11/7/2023</a:t>
             </a:fld>
             <a:endParaRPr lang="en-US"/>
           </a:p>
@@ -1864,7 +1869,7 @@
           <a:p>
             <a:fld id="{0B8780CC-EDEE-45A9-9439-C8B75D5F0949}" type="datetimeFigureOut">
               <a:rPr lang="en-US" smtClean="0"/>
-              <a:t>10/11/2023</a:t>
+              <a:t>11/7/2023</a:t>
             </a:fld>
             <a:endParaRPr lang="en-US"/>
           </a:p>
@@ -2005,7 +2010,7 @@
           <a:p>
             <a:fld id="{0B8780CC-EDEE-45A9-9439-C8B75D5F0949}" type="datetimeFigureOut">
               <a:rPr lang="en-US" smtClean="0"/>
-              <a:t>10/11/2023</a:t>
+              <a:t>11/7/2023</a:t>
             </a:fld>
             <a:endParaRPr lang="en-US"/>
           </a:p>
@@ -2118,7 +2123,7 @@
           <a:p>
             <a:fld id="{0B8780CC-EDEE-45A9-9439-C8B75D5F0949}" type="datetimeFigureOut">
               <a:rPr lang="en-US" smtClean="0"/>
-              <a:t>10/11/2023</a:t>
+              <a:t>11/7/2023</a:t>
             </a:fld>
             <a:endParaRPr lang="en-US"/>
           </a:p>
@@ -2429,7 +2434,7 @@
           <a:p>
             <a:fld id="{0B8780CC-EDEE-45A9-9439-C8B75D5F0949}" type="datetimeFigureOut">
               <a:rPr lang="en-US" smtClean="0"/>
-              <a:t>10/11/2023</a:t>
+              <a:t>11/7/2023</a:t>
             </a:fld>
             <a:endParaRPr lang="en-US"/>
           </a:p>
@@ -2717,7 +2722,7 @@
           <a:p>
             <a:fld id="{0B8780CC-EDEE-45A9-9439-C8B75D5F0949}" type="datetimeFigureOut">
               <a:rPr lang="en-US" smtClean="0"/>
-              <a:t>10/11/2023</a:t>
+              <a:t>11/7/2023</a:t>
             </a:fld>
             <a:endParaRPr lang="en-US"/>
           </a:p>
@@ -2794,9 +2799,19 @@
 <p:sldMaster xmlns:a="http://schemas.openxmlformats.org/drawingml/2006/main" xmlns:r="http://schemas.openxmlformats.org/officeDocument/2006/relationships" xmlns:p="http://schemas.openxmlformats.org/presentationml/2006/main">
   <p:cSld>
     <p:bg>
-      <p:bgRef idx="1001">
-        <a:schemeClr val="bg1"/>
-      </p:bgRef>
+      <p:bgPr>
+        <a:blipFill dpi="0" rotWithShape="1">
+          <a:blip r:embed="rId13">
+            <a:alphaModFix amt="40000"/>
+            <a:lum/>
+          </a:blip>
+          <a:srcRect/>
+          <a:stretch>
+            <a:fillRect b="-31000"/>
+          </a:stretch>
+        </a:blipFill>
+        <a:effectLst/>
+      </p:bgPr>
     </p:bg>
     <p:spTree>
       <p:nvGrpSpPr>
@@ -2958,7 +2973,7 @@
           <a:p>
             <a:fld id="{0B8780CC-EDEE-45A9-9439-C8B75D5F0949}" type="datetimeFigureOut">
               <a:rPr lang="en-US" smtClean="0"/>
-              <a:t>10/11/2023</a:t>
+              <a:t>11/7/2023</a:t>
             </a:fld>
             <a:endParaRPr lang="en-US"/>
           </a:p>

</xml_diff>